<commit_message>
Commit the lecture 13 for python class and object
</commit_message>
<xml_diff>
--- a/pythonBeginnerLecture/PythonPart12.pptx
+++ b/pythonBeginnerLecture/PythonPart12.pptx
@@ -272,7 +272,7 @@
           <a:p>
             <a:fld id="{C075C123-D6CD-4046-9E13-CA7186604EF0}" type="datetimeFigureOut">
               <a:rPr lang="zh-CN" altLang="en-US" smtClean="0"/>
-              <a:t>2021/3/5</a:t>
+              <a:t>2021/3/7</a:t>
             </a:fld>
             <a:endParaRPr lang="zh-CN" altLang="en-US"/>
           </a:p>
@@ -437,7 +437,7 @@
           <a:p>
             <a:fld id="{9E26DC34-D585-42D5-89F7-991AD639A885}" type="datetimeFigureOut">
               <a:rPr lang="zh-CN" altLang="en-US" smtClean="0"/>
-              <a:t>2021/3/5</a:t>
+              <a:t>2021/3/7</a:t>
             </a:fld>
             <a:endParaRPr lang="zh-CN" altLang="en-US"/>
           </a:p>
@@ -11941,7 +11941,7 @@
         <p:spPr>
           <a:xfrm>
             <a:off x="811737" y="675645"/>
-            <a:ext cx="5909951" cy="830997"/>
+            <a:ext cx="9097875" cy="830997"/>
           </a:xfrm>
           <a:prstGeom prst="rect">
             <a:avLst/>
@@ -11987,19 +11987,7 @@
                 <a:ea typeface="Noto Sans S Chinese Medium" panose="020B0600000000000000" pitchFamily="34" charset="-122"/>
                 <a:sym typeface="+mn-lt"/>
               </a:rPr>
-              <a:t>Python </a:t>
-            </a:r>
-            <a:r>
-              <a:rPr lang="en-CA" altLang="zh-CN" sz="4800" dirty="0">
-                <a:solidFill>
-                  <a:srgbClr val="009999"/>
-                </a:solidFill>
-                <a:effectLst/>
-                <a:latin typeface="+mj-lt"/>
-                <a:ea typeface="Noto Sans S Chinese Medium" panose="020B0600000000000000" pitchFamily="34" charset="-122"/>
-                <a:sym typeface="+mn-lt"/>
-              </a:rPr>
-              <a:t>Variable Scope</a:t>
+              <a:t>Python String, Date and Algorithm </a:t>
             </a:r>
             <a:endParaRPr lang="zh-CN" altLang="en-US" sz="4800" dirty="0">
               <a:solidFill>
@@ -23748,7 +23736,7 @@
           </a:ln>
           <a:extLst>
             <a:ext uri="{C572A759-6A51-4108-AA02-DFA0A04FC94B}">
-              <ma14:wrappingTextBoxFlag xmlns="" xmlns:ma14="http://schemas.microsoft.com/office/mac/drawingml/2011/main" val="1"/>
+              <ma14:wrappingTextBoxFlag xmlns:ma14="http://schemas.microsoft.com/office/mac/drawingml/2011/main" xmlns="" val="1"/>
             </a:ext>
           </a:extLst>
         </p:spPr>
@@ -24145,7 +24133,7 @@
           </a:ln>
           <a:extLst>
             <a:ext uri="{C572A759-6A51-4108-AA02-DFA0A04FC94B}">
-              <ma14:wrappingTextBoxFlag xmlns="" xmlns:ma14="http://schemas.microsoft.com/office/mac/drawingml/2011/main" val="1"/>
+              <ma14:wrappingTextBoxFlag xmlns:ma14="http://schemas.microsoft.com/office/mac/drawingml/2011/main" xmlns="" val="1"/>
             </a:ext>
           </a:extLst>
         </p:spPr>
@@ -29918,7 +29906,7 @@
           </a:ln>
           <a:extLst>
             <a:ext uri="{C572A759-6A51-4108-AA02-DFA0A04FC94B}">
-              <ma14:wrappingTextBoxFlag xmlns="" xmlns:ma14="http://schemas.microsoft.com/office/mac/drawingml/2011/main" val="1"/>
+              <ma14:wrappingTextBoxFlag xmlns:ma14="http://schemas.microsoft.com/office/mac/drawingml/2011/main" xmlns="" val="1"/>
             </a:ext>
           </a:extLst>
         </p:spPr>
@@ -40567,7 +40555,7 @@
           </a:ln>
           <a:extLst>
             <a:ext uri="{C572A759-6A51-4108-AA02-DFA0A04FC94B}">
-              <ma14:wrappingTextBoxFlag xmlns:ma14="http://schemas.microsoft.com/office/mac/drawingml/2011/main" xmlns="" val="1"/>
+              <ma14:wrappingTextBoxFlag xmlns="" xmlns:ma14="http://schemas.microsoft.com/office/mac/drawingml/2011/main" val="1"/>
             </a:ext>
           </a:extLst>
         </p:spPr>
@@ -41462,7 +41450,7 @@
           </a:ln>
           <a:extLst>
             <a:ext uri="{C572A759-6A51-4108-AA02-DFA0A04FC94B}">
-              <ma14:wrappingTextBoxFlag xmlns="" xmlns:ma14="http://schemas.microsoft.com/office/mac/drawingml/2011/main" val="1"/>
+              <ma14:wrappingTextBoxFlag xmlns:ma14="http://schemas.microsoft.com/office/mac/drawingml/2011/main" xmlns="" val="1"/>
             </a:ext>
           </a:extLst>
         </p:spPr>

</xml_diff>